<commit_message>
morning pptx and lp
</commit_message>
<xml_diff>
--- a/print/python2_4_3.pptx
+++ b/print/python2_4_3.pptx
@@ -488,7 +488,7 @@
       </p:grpSpPr>
       <p:sp>
         <p:nvSpPr>
-          <p:cNvPr id="209" name="Shape 209"/>
+          <p:cNvPr id="212" name="Shape 212"/>
           <p:cNvSpPr/>
           <p:nvPr>
             <p:ph type="sldImg"/>
@@ -509,7 +509,7 @@
       </p:sp>
       <p:sp>
         <p:nvSpPr>
-          <p:cNvPr id="210" name="Shape 210"/>
+          <p:cNvPr id="213" name="Shape 213"/>
           <p:cNvSpPr/>
           <p:nvPr>
             <p:ph type="body" sz="quarter" idx="1"/>
@@ -524,30 +524,21 @@
           <a:bodyPr/>
           <a:lstStyle/>
           <a:p>
-            <a:pPr/>
-            <a:r>
-              <a:t>+If a user entered their full name and I wanted to print back their initials, do we currently have a way to accomplish this? What do you think we would need to be able to do in order to make this possible? </a:t>
-            </a:r>
-          </a:p>
-          <a:p>
-            <a:pPr/>
-            <a:r>
-              <a:t>We don’t currently have a way to break strings up. In order to do this, we would need to be able to remove/save a certain portion of a string.</a:t>
-            </a:r>
-          </a:p>
-          <a:p>
-            <a:pPr/>
-          </a:p>
-          <a:p>
-            <a:pPr/>
-            <a:r>
-              <a:t>+If a user entered their full name (first and last) and we just wanted to print their last name, how could we do this using indexing? Give an example using your own name. </a:t>
-            </a:r>
-          </a:p>
-          <a:p>
-            <a:pPr/>
-            <a:r>
-              <a:t>We would need to index each character in their last name and concatenate these values together. Ex: name= Jay Bird; name[4] + name[5] + name[6] + name[7] OR name[-4] + name[-3] + name[-2] + name[-1])</a:t>
+            <a:pPr marL="187157" indent="-187157">
+              <a:buSzPct val="100000"/>
+              <a:buAutoNum type="arabicPeriod" startAt="1"/>
+            </a:pPr>
+            <a:r>
+              <a:t>It will print “L.H.S.”. We know this because name[i] will print the ith letter, so “L”, “H” and “S” separated by periods.</a:t>
+            </a:r>
+          </a:p>
+          <a:p>
+            <a:pPr marL="187157" indent="-187157">
+              <a:buSzPct val="100000"/>
+              <a:buAutoNum type="arabicPeriod" startAt="1"/>
+            </a:pPr>
+            <a:r>
+              <a:t>We can use slice name[i:j] will return all characters from index i up to but not including index j.  So we should chance the first instance of name[] to name[0:6]. We could also write name[:6].</a:t>
             </a:r>
           </a:p>
         </p:txBody>
@@ -579,7 +570,7 @@
       </p:grpSpPr>
       <p:sp>
         <p:nvSpPr>
-          <p:cNvPr id="221" name="Shape 221"/>
+          <p:cNvPr id="224" name="Shape 224"/>
           <p:cNvSpPr/>
           <p:nvPr>
             <p:ph type="sldImg"/>
@@ -600,7 +591,7 @@
       </p:sp>
       <p:sp>
         <p:nvSpPr>
-          <p:cNvPr id="222" name="Shape 222"/>
+          <p:cNvPr id="225" name="Shape 225"/>
           <p:cNvSpPr/>
           <p:nvPr>
             <p:ph type="body" sz="quarter" idx="1"/>
@@ -2138,7 +2129,7 @@
           <a:p>
             <a:pPr/>
             <a:r>
-              <a:t>Dr. O’Brien, 3/2/22</a:t>
+              <a:t>Dr. O’Brien, 3/3/22</a:t>
             </a:r>
           </a:p>
         </p:txBody>
@@ -6192,7 +6183,7 @@
               </a:defRPr>
             </a:pPr>
             <a:r>
-              <a:t>Lesson 4.3</a:t>
+              <a:t>Lesson 4.4</a:t>
             </a:r>
           </a:p>
         </p:txBody>
@@ -6247,7 +6238,7 @@
               <a:defRPr sz="1600"/>
             </a:pPr>
             <a:r>
-              <a:t>2 March 2022</a:t>
+              <a:t>3 March 2022</a:t>
             </a:r>
           </a:p>
         </p:txBody>
@@ -6749,60 +6740,258 @@
           <a:chExt cx="0" cy="0"/>
         </a:xfrm>
       </p:grpSpPr>
-      <p:sp>
-        <p:nvSpPr>
-          <p:cNvPr id="207" name="Do now"/>
+      <p:grpSp>
+        <p:nvGrpSpPr>
+          <p:cNvPr id="209" name="Google Shape;118;p19"/>
+          <p:cNvGrpSpPr/>
+          <p:nvPr/>
+        </p:nvGrpSpPr>
+        <p:grpSpPr>
+          <a:xfrm>
+            <a:off x="2147095" y="500360"/>
+            <a:ext cx="6535195" cy="810605"/>
+            <a:chOff x="0" y="0"/>
+            <a:chExt cx="6535193" cy="810604"/>
+          </a:xfrm>
+        </p:grpSpPr>
+        <p:sp>
+          <p:nvSpPr>
+            <p:cNvPr id="207" name="Rectangle"/>
+            <p:cNvSpPr/>
+            <p:nvPr/>
+          </p:nvSpPr>
+          <p:spPr>
+            <a:xfrm>
+              <a:off x="-1" y="-1"/>
+              <a:ext cx="6535195" cy="810606"/>
+            </a:xfrm>
+            <a:prstGeom prst="rect">
+              <a:avLst/>
+            </a:prstGeom>
+            <a:solidFill>
+              <a:srgbClr val="FFFFFF"/>
+            </a:solidFill>
+            <a:ln w="25400" cap="flat">
+              <a:solidFill>
+                <a:schemeClr val="accent1"/>
+              </a:solidFill>
+              <a:prstDash val="solid"/>
+              <a:round/>
+            </a:ln>
+            <a:effectLst/>
+          </p:spPr>
+          <p:txBody>
+            <a:bodyPr wrap="square" lIns="0" tIns="0" rIns="0" bIns="0" numCol="1" anchor="t">
+              <a:noAutofit/>
+            </a:bodyPr>
+            <a:lstStyle/>
+            <a:p>
+              <a:pPr>
+                <a:defRPr>
+                  <a:solidFill>
+                    <a:schemeClr val="accent3">
+                      <a:lumOff val="-9098"/>
+                    </a:schemeClr>
+                  </a:solidFill>
+                  <a:latin typeface="+mn-lt"/>
+                  <a:ea typeface="+mn-ea"/>
+                  <a:cs typeface="+mn-cs"/>
+                  <a:sym typeface="Helvetica"/>
+                </a:defRPr>
+              </a:pPr>
+            </a:p>
+          </p:txBody>
+        </p:sp>
+        <p:sp>
+          <p:nvSpPr>
+            <p:cNvPr id="208" name="Do now…"/>
+            <p:cNvSpPr txBox="1"/>
+            <p:nvPr/>
+          </p:nvSpPr>
+          <p:spPr>
+            <a:xfrm>
+              <a:off x="12699" y="12699"/>
+              <a:ext cx="6509795" cy="785206"/>
+            </a:xfrm>
+            <a:prstGeom prst="rect">
+              <a:avLst/>
+            </a:prstGeom>
+            <a:noFill/>
+            <a:ln w="12700" cap="flat">
+              <a:noFill/>
+              <a:miter lim="400000"/>
+            </a:ln>
+            <a:effectLst/>
+            <a:extLst>
+              <a:ext uri="{C572A759-6A51-4108-AA02-DFA0A04FC94B}">
+                <ma14:wrappingTextBoxFlag xmlns:ma14="http://schemas.microsoft.com/office/mac/drawingml/2011/main" val="1"/>
+              </a:ext>
+            </a:extLst>
+          </p:spPr>
+          <p:txBody>
+            <a:bodyPr wrap="square" lIns="91422" tIns="91422" rIns="91422" bIns="91422" numCol="1" anchor="t">
+              <a:normAutofit fontScale="100000" lnSpcReduction="0"/>
+            </a:bodyPr>
+            <a:lstStyle/>
+            <a:p>
+              <a:pPr defTabSz="557784">
+                <a:defRPr sz="1769"/>
+              </a:pPr>
+              <a:r>
+                <a:t>Do now</a:t>
+              </a:r>
+            </a:p>
+            <a:p>
+              <a:pPr defTabSz="557784">
+                <a:defRPr sz="1098">
+                  <a:solidFill>
+                    <a:schemeClr val="accent5"/>
+                  </a:solidFill>
+                  <a:latin typeface="+mn-lt"/>
+                  <a:ea typeface="+mn-ea"/>
+                  <a:cs typeface="+mn-cs"/>
+                  <a:sym typeface="Helvetica"/>
+                </a:defRPr>
+              </a:pPr>
+              <a:r>
+                <a:t>be sure to:</a:t>
+              </a:r>
+              <a:r>
+                <a:rPr>
+                  <a:solidFill>
+                    <a:schemeClr val="accent5">
+                      <a:lumOff val="-9843"/>
+                    </a:schemeClr>
+                  </a:solidFill>
+                </a:rPr>
+                <a:t> </a:t>
+              </a:r>
+              <a:r>
+                <a:rPr>
+                  <a:solidFill>
+                    <a:schemeClr val="accent1"/>
+                  </a:solidFill>
+                </a:rPr>
+                <a:t>Take out notebook. Write down date/goal. Answer the question below in</a:t>
+              </a:r>
+              <a:endParaRPr>
+                <a:solidFill>
+                  <a:schemeClr val="accent1"/>
+                </a:solidFill>
+              </a:endParaRPr>
+            </a:p>
+            <a:p>
+              <a:pPr defTabSz="557784">
+                <a:defRPr sz="1098">
+                  <a:solidFill>
+                    <a:schemeClr val="accent5"/>
+                  </a:solidFill>
+                  <a:latin typeface="+mn-lt"/>
+                  <a:ea typeface="+mn-ea"/>
+                  <a:cs typeface="+mn-cs"/>
+                  <a:sym typeface="Helvetica"/>
+                </a:defRPr>
+              </a:pPr>
+              <a:r>
+                <a:rPr>
+                  <a:solidFill>
+                    <a:schemeClr val="accent1"/>
+                  </a:solidFill>
+                </a:rPr>
+                <a:t> complete sentences</a:t>
+              </a:r>
+            </a:p>
+          </p:txBody>
+        </p:sp>
+      </p:grpSp>
+      <p:pic>
+        <p:nvPicPr>
+          <p:cNvPr id="210" name="Image" descr="Image"/>
+          <p:cNvPicPr>
+            <a:picLocks noChangeAspect="1"/>
+          </p:cNvPicPr>
+          <p:nvPr/>
+        </p:nvPicPr>
+        <p:blipFill>
+          <a:blip r:embed="rId3">
+            <a:extLst/>
+          </a:blip>
+          <a:stretch>
+            <a:fillRect/>
+          </a:stretch>
+        </p:blipFill>
+        <p:spPr>
+          <a:xfrm>
+            <a:off x="2045211" y="3480419"/>
+            <a:ext cx="4781039" cy="511774"/>
+          </a:xfrm>
+          <a:prstGeom prst="rect">
+            <a:avLst/>
+          </a:prstGeom>
+          <a:ln w="12700">
+            <a:miter lim="400000"/>
+          </a:ln>
+        </p:spPr>
+      </p:pic>
+      <p:sp>
+        <p:nvSpPr>
+          <p:cNvPr id="211" name="What will the code below print out? Explain how you know.…"/>
           <p:cNvSpPr txBox="1"/>
-          <p:nvPr>
-            <p:ph type="title"/>
-          </p:nvPr>
-        </p:nvSpPr>
-        <p:spPr>
+          <p:nvPr/>
+        </p:nvSpPr>
+        <p:spPr>
+          <a:xfrm>
+            <a:off x="2039944" y="1950344"/>
+            <a:ext cx="6785143" cy="416299"/>
+          </a:xfrm>
           <a:prstGeom prst="rect">
             <a:avLst/>
           </a:prstGeom>
-        </p:spPr>
-        <p:txBody>
-          <a:bodyPr/>
-          <a:lstStyle>
-            <a:lvl1pPr defTabSz="886968">
-              <a:defRPr sz="2910"/>
-            </a:lvl1pPr>
-          </a:lstStyle>
-          <a:p>
-            <a:pPr/>
-            <a:r>
-              <a:t>Do now</a:t>
-            </a:r>
-          </a:p>
-        </p:txBody>
-      </p:sp>
-      <p:sp>
-        <p:nvSpPr>
-          <p:cNvPr id="208" name="If a user entered their full name and I wanted to print back their initials, how could we accomplish this?…"/>
-          <p:cNvSpPr txBox="1"/>
-          <p:nvPr>
-            <p:ph type="body" idx="1"/>
-          </p:nvPr>
-        </p:nvSpPr>
-        <p:spPr>
-          <a:prstGeom prst="rect">
-            <a:avLst/>
-          </a:prstGeom>
-        </p:spPr>
-        <p:txBody>
-          <a:bodyPr/>
+          <a:ln w="12700">
+            <a:miter lim="400000"/>
+          </a:ln>
+          <a:extLst>
+            <a:ext uri="{C572A759-6A51-4108-AA02-DFA0A04FC94B}">
+              <ma14:wrappingTextBoxFlag xmlns:ma14="http://schemas.microsoft.com/office/mac/drawingml/2011/main" val="1"/>
+            </a:ext>
+          </a:extLst>
+        </p:spPr>
+        <p:txBody>
+          <a:bodyPr wrap="none" lIns="0" tIns="0" rIns="0" bIns="0">
+            <a:spAutoFit/>
+          </a:bodyPr>
           <a:lstStyle/>
           <a:p>
-            <a:pPr/>
-            <a:r>
-              <a:t> If a user entered their full name and I wanted to print back their initials, how could we accomplish this?</a:t>
-            </a:r>
-          </a:p>
-          <a:p>
-            <a:pPr/>
-            <a:r>
-              <a:t> If a user entered their full name (first and last) and we just wanted to print their last name, how could we do this using indexing? Give an example using your own name. </a:t>
+            <a:pPr marL="187157" indent="-187157">
+              <a:buSzPct val="100000"/>
+              <a:buAutoNum type="arabicPeriod" startAt="1"/>
+            </a:pPr>
+            <a:r>
+              <a:t>What will the code below print out? Explain how you know.</a:t>
+            </a:r>
+          </a:p>
+          <a:p>
+            <a:pPr marL="187157" indent="-187157">
+              <a:buSzPct val="100000"/>
+              <a:buAutoNum type="arabicPeriod" startAt="1"/>
+            </a:pPr>
+            <a:r>
+              <a:t>How could you modify this code so it prints </a:t>
+            </a:r>
+            <a:r>
+              <a:rPr>
+                <a:solidFill>
+                  <a:srgbClr val="000000"/>
+                </a:solidFill>
+                <a:latin typeface="Courier New"/>
+                <a:ea typeface="Courier New"/>
+                <a:cs typeface="Courier New"/>
+                <a:sym typeface="Courier New"/>
+              </a:rPr>
+              <a:t>“Lehman H.S.”</a:t>
+            </a:r>
+            <a:r>
+              <a:t>? Explain your answer.</a:t>
             </a:r>
           </a:p>
         </p:txBody>
@@ -6835,7 +7024,7 @@
       </p:grpSpPr>
       <p:sp>
         <p:nvSpPr>
-          <p:cNvPr id="212" name="Double-click to edit"/>
+          <p:cNvPr id="215" name="Double-click to edit"/>
           <p:cNvSpPr txBox="1"/>
           <p:nvPr>
             <p:ph type="title"/>
@@ -6858,7 +7047,7 @@
       </p:sp>
       <p:grpSp>
         <p:nvGrpSpPr>
-          <p:cNvPr id="215" name="Google Shape;118;p19"/>
+          <p:cNvPr id="218" name="Google Shape;118;p19"/>
           <p:cNvGrpSpPr/>
           <p:nvPr/>
         </p:nvGrpSpPr>
@@ -6872,7 +7061,7 @@
         </p:grpSpPr>
         <p:sp>
           <p:nvSpPr>
-            <p:cNvPr id="213" name="Rectangle"/>
+            <p:cNvPr id="216" name="Rectangle"/>
             <p:cNvSpPr/>
             <p:nvPr/>
           </p:nvSpPr>
@@ -6920,7 +7109,7 @@
         </p:sp>
         <p:sp>
           <p:nvSpPr>
-            <p:cNvPr id="214" name="Work day"/>
+            <p:cNvPr id="217" name="Work day"/>
             <p:cNvSpPr txBox="1"/>
             <p:nvPr/>
           </p:nvSpPr>
@@ -6964,7 +7153,7 @@
       </p:grpSp>
       <p:sp>
         <p:nvSpPr>
-          <p:cNvPr id="216" name="be sure to:"/>
+          <p:cNvPr id="219" name="be sure to:"/>
           <p:cNvSpPr txBox="1"/>
           <p:nvPr/>
         </p:nvSpPr>
@@ -7012,7 +7201,7 @@
       </p:sp>
       <p:sp>
         <p:nvSpPr>
-          <p:cNvPr id="217" name="Weekly Goal:…"/>
+          <p:cNvPr id="220" name="Weekly Goal:…"/>
           <p:cNvSpPr txBox="1"/>
           <p:nvPr/>
         </p:nvSpPr>
@@ -7094,7 +7283,7 @@
       </p:sp>
       <p:sp>
         <p:nvSpPr>
-          <p:cNvPr id="218" name="Google Shape;82;p14"/>
+          <p:cNvPr id="221" name="Google Shape;82;p14"/>
           <p:cNvSpPr txBox="1"/>
           <p:nvPr/>
         </p:nvSpPr>
@@ -7187,7 +7376,7 @@
       </p:sp>
       <p:sp>
         <p:nvSpPr>
-          <p:cNvPr id="219" name="be sure to:"/>
+          <p:cNvPr id="222" name="be sure to:"/>
           <p:cNvSpPr txBox="1"/>
           <p:nvPr/>
         </p:nvSpPr>
@@ -7235,7 +7424,7 @@
       </p:sp>
       <p:sp>
         <p:nvSpPr>
-          <p:cNvPr id="220" name="framing…"/>
+          <p:cNvPr id="223" name="framing…"/>
           <p:cNvSpPr txBox="1"/>
           <p:nvPr/>
         </p:nvSpPr>
@@ -7412,7 +7601,7 @@
                                       <p:cBhvr>
                                         <p:cTn id="6" fill="hold"/>
                                         <p:tgtEl>
-                                          <p:spTgt spid="218">
+                                          <p:spTgt spid="221">
                                             <p:bg/>
                                           </p:spTgt>
                                         </p:tgtEl>
@@ -7440,7 +7629,7 @@
                                       <p:cBhvr>
                                         <p:cTn id="8" fill="hold"/>
                                         <p:tgtEl>
-                                          <p:spTgt spid="218">
+                                          <p:spTgt spid="221">
                                             <p:txEl>
                                               <p:pRg st="0" end="0"/>
                                             </p:txEl>
@@ -7479,7 +7668,7 @@
                                       <p:cBhvr>
                                         <p:cTn id="11" fill="hold"/>
                                         <p:tgtEl>
-                                          <p:spTgt spid="218">
+                                          <p:spTgt spid="221">
                                             <p:txEl>
                                               <p:pRg st="1" end="1"/>
                                             </p:txEl>
@@ -7527,7 +7716,7 @@
                                       <p:cBhvr>
                                         <p:cTn id="15" fill="hold"/>
                                         <p:tgtEl>
-                                          <p:spTgt spid="218">
+                                          <p:spTgt spid="221">
                                             <p:txEl>
                                               <p:pRg st="2" end="2"/>
                                             </p:txEl>
@@ -7575,7 +7764,7 @@
                                       <p:cBhvr>
                                         <p:cTn id="19" fill="hold"/>
                                         <p:tgtEl>
-                                          <p:spTgt spid="220">
+                                          <p:spTgt spid="223">
                                             <p:bg/>
                                           </p:spTgt>
                                         </p:tgtEl>
@@ -7603,7 +7792,7 @@
                                       <p:cBhvr>
                                         <p:cTn id="21" fill="hold"/>
                                         <p:tgtEl>
-                                          <p:spTgt spid="220">
+                                          <p:spTgt spid="223">
                                             <p:txEl>
                                               <p:pRg st="0" end="0"/>
                                             </p:txEl>
@@ -7651,7 +7840,7 @@
                                       <p:cBhvr>
                                         <p:cTn id="25" fill="hold"/>
                                         <p:tgtEl>
-                                          <p:spTgt spid="220">
+                                          <p:spTgt spid="223">
                                             <p:txEl>
                                               <p:pRg st="1" end="1"/>
                                             </p:txEl>
@@ -7699,7 +7888,7 @@
                                       <p:cBhvr>
                                         <p:cTn id="29" fill="hold"/>
                                         <p:tgtEl>
-                                          <p:spTgt spid="220">
+                                          <p:spTgt spid="223">
                                             <p:txEl>
                                               <p:pRg st="2" end="2"/>
                                             </p:txEl>
@@ -7747,7 +7936,7 @@
                                       <p:cBhvr>
                                         <p:cTn id="33" fill="hold"/>
                                         <p:tgtEl>
-                                          <p:spTgt spid="220">
+                                          <p:spTgt spid="223">
                                             <p:txEl>
                                               <p:pRg st="3" end="3"/>
                                             </p:txEl>
@@ -7792,8 +7981,8 @@
       </p:par>
     </p:tnLst>
     <p:bldLst>
-      <p:bldP build="p" bldLvl="5" animBg="1" rev="0" advAuto="0" spid="218" grpId="1"/>
-      <p:bldP build="p" bldLvl="5" animBg="1" rev="0" advAuto="0" spid="220" grpId="2"/>
+      <p:bldP build="p" bldLvl="5" animBg="1" rev="0" advAuto="0" spid="221" grpId="1"/>
+      <p:bldP build="p" bldLvl="5" animBg="1" rev="0" advAuto="0" spid="223" grpId="2"/>
     </p:bldLst>
   </p:timing>
 </p:sld>
@@ -7818,7 +8007,7 @@
       </p:grpSpPr>
       <p:sp>
         <p:nvSpPr>
-          <p:cNvPr id="224" name="Double-click to edit"/>
+          <p:cNvPr id="227" name="Double-click to edit"/>
           <p:cNvSpPr txBox="1"/>
           <p:nvPr>
             <p:ph type="title"/>
@@ -7841,7 +8030,7 @@
       </p:sp>
       <p:sp>
         <p:nvSpPr>
-          <p:cNvPr id="225" name="Google Shape;119;p19"/>
+          <p:cNvPr id="228" name="Google Shape;119;p19"/>
           <p:cNvSpPr txBox="1"/>
           <p:nvPr/>
         </p:nvSpPr>
@@ -7939,7 +8128,7 @@
       </p:sp>
       <p:grpSp>
         <p:nvGrpSpPr>
-          <p:cNvPr id="228" name="Google Shape;118;p19"/>
+          <p:cNvPr id="231" name="Google Shape;118;p19"/>
           <p:cNvGrpSpPr/>
           <p:nvPr/>
         </p:nvGrpSpPr>
@@ -7953,7 +8142,7 @@
         </p:grpSpPr>
         <p:sp>
           <p:nvSpPr>
-            <p:cNvPr id="226" name="Rectangle"/>
+            <p:cNvPr id="229" name="Rectangle"/>
             <p:cNvSpPr/>
             <p:nvPr/>
           </p:nvSpPr>
@@ -8001,7 +8190,7 @@
         </p:sp>
         <p:sp>
           <p:nvSpPr>
-            <p:cNvPr id="227" name="wrapping up!…"/>
+            <p:cNvPr id="230" name="wrapping up!…"/>
             <p:cNvSpPr txBox="1"/>
             <p:nvPr/>
           </p:nvSpPr>
@@ -8077,7 +8266,7 @@
       </p:grpSp>
       <p:pic>
         <p:nvPicPr>
-          <p:cNvPr id="229" name="Image" descr="Image"/>
+          <p:cNvPr id="232" name="Image" descr="Image"/>
           <p:cNvPicPr>
             <a:picLocks noChangeAspect="1"/>
           </p:cNvPicPr>
@@ -8132,7 +8321,7 @@
       </p:grpSpPr>
       <p:sp>
         <p:nvSpPr>
-          <p:cNvPr id="231" name="Double-click to edit"/>
+          <p:cNvPr id="234" name="Double-click to edit"/>
           <p:cNvSpPr txBox="1"/>
           <p:nvPr>
             <p:ph type="title"/>
@@ -8155,7 +8344,7 @@
       </p:sp>
       <p:sp>
         <p:nvSpPr>
-          <p:cNvPr id="232" name="a. Students will receive their phones at the end of 9th period and 10th period.…"/>
+          <p:cNvPr id="235" name="a. Students will receive their phones at the end of 9th period and 10th period.…"/>
           <p:cNvSpPr txBox="1"/>
           <p:nvPr/>
         </p:nvSpPr>
@@ -8221,7 +8410,7 @@
       </p:sp>
       <p:grpSp>
         <p:nvGrpSpPr>
-          <p:cNvPr id="235" name="Google Shape;118;p19"/>
+          <p:cNvPr id="238" name="Google Shape;118;p19"/>
           <p:cNvGrpSpPr/>
           <p:nvPr/>
         </p:nvGrpSpPr>
@@ -8235,7 +8424,7 @@
         </p:grpSpPr>
         <p:sp>
           <p:nvSpPr>
-            <p:cNvPr id="233" name="Rectangle"/>
+            <p:cNvPr id="236" name="Rectangle"/>
             <p:cNvSpPr/>
             <p:nvPr/>
           </p:nvSpPr>
@@ -8283,7 +8472,7 @@
         </p:sp>
         <p:sp>
           <p:nvSpPr>
-            <p:cNvPr id="234" name="Cell phone distro…"/>
+            <p:cNvPr id="237" name="Cell phone distro…"/>
             <p:cNvSpPr txBox="1"/>
             <p:nvPr/>
           </p:nvSpPr>

</xml_diff>